<commit_message>
Reordered tables in ER diagram
</commit_message>
<xml_diff>
--- a/Diagrams.pptx
+++ b/Diagrams.pptx
@@ -200,7 +200,7 @@
           <a:p>
             <a:fld id="{1E0D9143-379F-D641-9F6F-62298B9A6551}" type="datetimeFigureOut">
               <a:rPr lang="en-US" smtClean="0"/>
-              <a:t>9/6/17</a:t>
+              <a:t>9/7/17</a:t>
             </a:fld>
             <a:endParaRPr lang="en-US"/>
           </a:p>
@@ -683,7 +683,7 @@
           <a:p>
             <a:fld id="{17F2352A-96E9-B541-9ED8-DA35F07C9869}" type="datetimeFigureOut">
               <a:rPr lang="en-US" smtClean="0"/>
-              <a:t>9/6/17</a:t>
+              <a:t>9/7/17</a:t>
             </a:fld>
             <a:endParaRPr lang="en-US"/>
           </a:p>
@@ -848,7 +848,7 @@
           <a:p>
             <a:fld id="{17F2352A-96E9-B541-9ED8-DA35F07C9869}" type="datetimeFigureOut">
               <a:rPr lang="en-US" smtClean="0"/>
-              <a:t>9/6/17</a:t>
+              <a:t>9/7/17</a:t>
             </a:fld>
             <a:endParaRPr lang="en-US"/>
           </a:p>
@@ -1023,7 +1023,7 @@
           <a:p>
             <a:fld id="{17F2352A-96E9-B541-9ED8-DA35F07C9869}" type="datetimeFigureOut">
               <a:rPr lang="en-US" smtClean="0"/>
-              <a:t>9/6/17</a:t>
+              <a:t>9/7/17</a:t>
             </a:fld>
             <a:endParaRPr lang="en-US"/>
           </a:p>
@@ -1188,7 +1188,7 @@
           <a:p>
             <a:fld id="{17F2352A-96E9-B541-9ED8-DA35F07C9869}" type="datetimeFigureOut">
               <a:rPr lang="en-US" smtClean="0"/>
-              <a:t>9/6/17</a:t>
+              <a:t>9/7/17</a:t>
             </a:fld>
             <a:endParaRPr lang="en-US"/>
           </a:p>
@@ -1429,7 +1429,7 @@
           <a:p>
             <a:fld id="{17F2352A-96E9-B541-9ED8-DA35F07C9869}" type="datetimeFigureOut">
               <a:rPr lang="en-US" smtClean="0"/>
-              <a:t>9/6/17</a:t>
+              <a:t>9/7/17</a:t>
             </a:fld>
             <a:endParaRPr lang="en-US"/>
           </a:p>
@@ -1656,7 +1656,7 @@
           <a:p>
             <a:fld id="{17F2352A-96E9-B541-9ED8-DA35F07C9869}" type="datetimeFigureOut">
               <a:rPr lang="en-US" smtClean="0"/>
-              <a:t>9/6/17</a:t>
+              <a:t>9/7/17</a:t>
             </a:fld>
             <a:endParaRPr lang="en-US"/>
           </a:p>
@@ -2018,7 +2018,7 @@
           <a:p>
             <a:fld id="{17F2352A-96E9-B541-9ED8-DA35F07C9869}" type="datetimeFigureOut">
               <a:rPr lang="en-US" smtClean="0"/>
-              <a:t>9/6/17</a:t>
+              <a:t>9/7/17</a:t>
             </a:fld>
             <a:endParaRPr lang="en-US"/>
           </a:p>
@@ -2131,7 +2131,7 @@
           <a:p>
             <a:fld id="{17F2352A-96E9-B541-9ED8-DA35F07C9869}" type="datetimeFigureOut">
               <a:rPr lang="en-US" smtClean="0"/>
-              <a:t>9/6/17</a:t>
+              <a:t>9/7/17</a:t>
             </a:fld>
             <a:endParaRPr lang="en-US"/>
           </a:p>
@@ -2221,7 +2221,7 @@
           <a:p>
             <a:fld id="{17F2352A-96E9-B541-9ED8-DA35F07C9869}" type="datetimeFigureOut">
               <a:rPr lang="en-US" smtClean="0"/>
-              <a:t>9/6/17</a:t>
+              <a:t>9/7/17</a:t>
             </a:fld>
             <a:endParaRPr lang="en-US"/>
           </a:p>
@@ -2493,7 +2493,7 @@
           <a:p>
             <a:fld id="{17F2352A-96E9-B541-9ED8-DA35F07C9869}" type="datetimeFigureOut">
               <a:rPr lang="en-US" smtClean="0"/>
-              <a:t>9/6/17</a:t>
+              <a:t>9/7/17</a:t>
             </a:fld>
             <a:endParaRPr lang="en-US"/>
           </a:p>
@@ -2741,7 +2741,7 @@
           <a:p>
             <a:fld id="{17F2352A-96E9-B541-9ED8-DA35F07C9869}" type="datetimeFigureOut">
               <a:rPr lang="en-US" smtClean="0"/>
-              <a:t>9/6/17</a:t>
+              <a:t>9/7/17</a:t>
             </a:fld>
             <a:endParaRPr lang="en-US"/>
           </a:p>
@@ -2949,7 +2949,7 @@
           <a:p>
             <a:fld id="{17F2352A-96E9-B541-9ED8-DA35F07C9869}" type="datetimeFigureOut">
               <a:rPr lang="en-US" smtClean="0"/>
-              <a:t>9/6/17</a:t>
+              <a:t>9/7/17</a:t>
             </a:fld>
             <a:endParaRPr lang="en-US"/>
           </a:p>
@@ -3441,12 +3441,12 @@
           <a:graphicData uri="http://schemas.openxmlformats.org/presentationml/2006/ole">
             <mc:AlternateContent xmlns:mc="http://schemas.openxmlformats.org/markup-compatibility/2006">
               <mc:Choice xmlns:v="urn:schemas-microsoft-com:vml" Requires="v">
-                <p:oleObj spid="_x0000_s2054" name="Worksheet" r:id="rId3" imgW="3784600" imgH="3873500" progId="Excel.Sheet.12">
+                <p:oleObj spid="_x0000_s2056" name="Worksheet" r:id="rId4" imgW="3784600" imgH="3873500" progId="Excel.Sheet.12">
                   <p:embed/>
                 </p:oleObj>
               </mc:Choice>
               <mc:Fallback>
-                <p:oleObj name="Worksheet" r:id="rId3" imgW="3784600" imgH="3873500" progId="Excel.Sheet.12">
+                <p:oleObj name="Worksheet" r:id="rId4" imgW="3784600" imgH="3873500" progId="Excel.Sheet.12">
                   <p:embed/>
                   <p:pic>
                     <p:nvPicPr>
@@ -3455,7 +3455,7 @@
                       <p:nvPr/>
                     </p:nvPicPr>
                     <p:blipFill>
-                      <a:blip r:embed="rId4"/>
+                      <a:blip r:embed="rId5"/>
                       <a:stretch>
                         <a:fillRect/>
                       </a:stretch>
@@ -3515,13 +3515,13 @@
           <p:nvPr>
             <p:extLst>
               <p:ext uri="{D42A27DB-BD31-4B8C-83A1-F6EECF244321}">
-                <p14:modId xmlns:p14="http://schemas.microsoft.com/office/powerpoint/2010/main" val="667939988"/>
+                <p14:modId xmlns:p14="http://schemas.microsoft.com/office/powerpoint/2010/main" val="1584319448"/>
               </p:ext>
             </p:extLst>
           </p:nvPr>
         </p:nvGraphicFramePr>
         <p:xfrm>
-          <a:off x="4916285" y="2212780"/>
+          <a:off x="1108559" y="2212780"/>
           <a:ext cx="2051269" cy="2225040"/>
         </p:xfrm>
         <a:graphic>
@@ -4093,13 +4093,13 @@
           <p:nvPr>
             <p:extLst>
               <p:ext uri="{D42A27DB-BD31-4B8C-83A1-F6EECF244321}">
-                <p14:modId xmlns:p14="http://schemas.microsoft.com/office/powerpoint/2010/main" val="351924166"/>
+                <p14:modId xmlns:p14="http://schemas.microsoft.com/office/powerpoint/2010/main" val="1007223383"/>
               </p:ext>
             </p:extLst>
           </p:nvPr>
         </p:nvGraphicFramePr>
         <p:xfrm>
-          <a:off x="1159161" y="2398520"/>
+          <a:off x="4890984" y="2398520"/>
           <a:ext cx="2051269" cy="2039300"/>
         </p:xfrm>
         <a:graphic>
@@ -4385,7 +4385,7 @@
           <a:graphicData uri="http://schemas.openxmlformats.org/presentationml/2006/ole">
             <mc:AlternateContent xmlns:mc="http://schemas.openxmlformats.org/markup-compatibility/2006">
               <mc:Choice xmlns:v="urn:schemas-microsoft-com:vml" Requires="v">
-                <p:oleObj spid="_x0000_s1196" name="Worksheet" r:id="rId4" imgW="1663700" imgH="1028700" progId="Excel.Sheet.12">
+                <p:oleObj spid="_x0000_s1209" name="Worksheet" r:id="rId4" imgW="1663700" imgH="1028700" progId="Excel.Sheet.12">
                   <p:embed/>
                 </p:oleObj>
               </mc:Choice>
@@ -4442,7 +4442,7 @@
           <a:graphicData uri="http://schemas.openxmlformats.org/presentationml/2006/ole">
             <mc:AlternateContent xmlns:mc="http://schemas.openxmlformats.org/markup-compatibility/2006">
               <mc:Choice xmlns:v="urn:schemas-microsoft-com:vml" Requires="v">
-                <p:oleObj spid="_x0000_s1197" name="Worksheet" r:id="rId7" imgW="1663700" imgH="1485900" progId="Excel.Sheet.12">
+                <p:oleObj spid="_x0000_s1210" name="Worksheet" r:id="rId7" imgW="1663700" imgH="1485900" progId="Excel.Sheet.12">
                   <p:embed/>
                 </p:oleObj>
               </mc:Choice>
@@ -4499,7 +4499,7 @@
           <a:graphicData uri="http://schemas.openxmlformats.org/presentationml/2006/ole">
             <mc:AlternateContent xmlns:mc="http://schemas.openxmlformats.org/markup-compatibility/2006">
               <mc:Choice xmlns:v="urn:schemas-microsoft-com:vml" Requires="v">
-                <p:oleObj spid="_x0000_s1198" name="Worksheet" r:id="rId10" imgW="838200" imgH="215900" progId="Excel.Sheet.12">
+                <p:oleObj spid="_x0000_s1211" name="Worksheet" r:id="rId10" imgW="838200" imgH="215900" progId="Excel.Sheet.12">
                   <p:embed/>
                 </p:oleObj>
               </mc:Choice>
@@ -4556,7 +4556,7 @@
           <a:graphicData uri="http://schemas.openxmlformats.org/presentationml/2006/ole">
             <mc:AlternateContent xmlns:mc="http://schemas.openxmlformats.org/markup-compatibility/2006">
               <mc:Choice xmlns:v="urn:schemas-microsoft-com:vml" Requires="v">
-                <p:oleObj spid="_x0000_s1199" name="Worksheet" r:id="rId13" imgW="838200" imgH="215900" progId="Excel.Sheet.12">
+                <p:oleObj spid="_x0000_s1212" name="Worksheet" r:id="rId13" imgW="838200" imgH="215900" progId="Excel.Sheet.12">
                   <p:embed/>
                 </p:oleObj>
               </mc:Choice>
@@ -4673,7 +4673,7 @@
           <a:graphicData uri="http://schemas.openxmlformats.org/presentationml/2006/ole">
             <mc:AlternateContent xmlns:mc="http://schemas.openxmlformats.org/markup-compatibility/2006">
               <mc:Choice xmlns:v="urn:schemas-microsoft-com:vml" Requires="v">
-                <p:oleObj spid="_x0000_s1200" name="Worksheet" r:id="rId16" imgW="1663700" imgH="622300" progId="Excel.Sheet.12">
+                <p:oleObj spid="_x0000_s1213" name="Worksheet" r:id="rId16" imgW="1663700" imgH="622300" progId="Excel.Sheet.12">
                   <p:embed/>
                 </p:oleObj>
               </mc:Choice>
@@ -4730,7 +4730,7 @@
           <a:graphicData uri="http://schemas.openxmlformats.org/presentationml/2006/ole">
             <mc:AlternateContent xmlns:mc="http://schemas.openxmlformats.org/markup-compatibility/2006">
               <mc:Choice xmlns:v="urn:schemas-microsoft-com:vml" Requires="v">
-                <p:oleObj spid="_x0000_s1201" name="Worksheet" r:id="rId19" imgW="1663700" imgH="635000" progId="Excel.Sheet.12">
+                <p:oleObj spid="_x0000_s1214" name="Worksheet" r:id="rId19" imgW="1663700" imgH="635000" progId="Excel.Sheet.12">
                   <p:embed/>
                 </p:oleObj>
               </mc:Choice>
@@ -4787,7 +4787,7 @@
           <a:graphicData uri="http://schemas.openxmlformats.org/presentationml/2006/ole">
             <mc:AlternateContent xmlns:mc="http://schemas.openxmlformats.org/markup-compatibility/2006">
               <mc:Choice xmlns:v="urn:schemas-microsoft-com:vml" Requires="v">
-                <p:oleObj spid="_x0000_s1202" name="Worksheet" r:id="rId22" imgW="1663700" imgH="622300" progId="Excel.Sheet.12">
+                <p:oleObj spid="_x0000_s1215" name="Worksheet" r:id="rId22" imgW="1663700" imgH="622300" progId="Excel.Sheet.12">
                   <p:embed/>
                 </p:oleObj>
               </mc:Choice>
@@ -4844,7 +4844,7 @@
           <a:graphicData uri="http://schemas.openxmlformats.org/presentationml/2006/ole">
             <mc:AlternateContent xmlns:mc="http://schemas.openxmlformats.org/markup-compatibility/2006">
               <mc:Choice xmlns:v="urn:schemas-microsoft-com:vml" Requires="v">
-                <p:oleObj spid="_x0000_s1203" name="Worksheet" r:id="rId25" imgW="1422400" imgH="622300" progId="Excel.Sheet.12">
+                <p:oleObj spid="_x0000_s1216" name="Worksheet" r:id="rId25" imgW="1422400" imgH="622300" progId="Excel.Sheet.12">
                   <p:embed/>
                 </p:oleObj>
               </mc:Choice>
@@ -4901,7 +4901,7 @@
           <a:graphicData uri="http://schemas.openxmlformats.org/presentationml/2006/ole">
             <mc:AlternateContent xmlns:mc="http://schemas.openxmlformats.org/markup-compatibility/2006">
               <mc:Choice xmlns:v="urn:schemas-microsoft-com:vml" Requires="v">
-                <p:oleObj spid="_x0000_s1204" name="Worksheet" r:id="rId28" imgW="1663700" imgH="622300" progId="Excel.Sheet.12">
+                <p:oleObj spid="_x0000_s1217" name="Worksheet" r:id="rId28" imgW="1663700" imgH="622300" progId="Excel.Sheet.12">
                   <p:embed/>
                 </p:oleObj>
               </mc:Choice>
@@ -4958,7 +4958,7 @@
           <a:graphicData uri="http://schemas.openxmlformats.org/presentationml/2006/ole">
             <mc:AlternateContent xmlns:mc="http://schemas.openxmlformats.org/markup-compatibility/2006">
               <mc:Choice xmlns:v="urn:schemas-microsoft-com:vml" Requires="v">
-                <p:oleObj spid="_x0000_s1205" name="Worksheet" r:id="rId31" imgW="1663700" imgH="622300" progId="Excel.Sheet.12">
+                <p:oleObj spid="_x0000_s1218" name="Worksheet" r:id="rId31" imgW="1663700" imgH="622300" progId="Excel.Sheet.12">
                   <p:embed/>
                 </p:oleObj>
               </mc:Choice>
@@ -5183,7 +5183,7 @@
           <a:graphicData uri="http://schemas.openxmlformats.org/presentationml/2006/ole">
             <mc:AlternateContent xmlns:mc="http://schemas.openxmlformats.org/markup-compatibility/2006">
               <mc:Choice xmlns:v="urn:schemas-microsoft-com:vml" Requires="v">
-                <p:oleObj spid="_x0000_s1206" name="Worksheet" r:id="rId34" imgW="1663700" imgH="419100" progId="Excel.Sheet.12">
+                <p:oleObj spid="_x0000_s1219" name="Worksheet" r:id="rId34" imgW="1663700" imgH="419100" progId="Excel.Sheet.12">
                   <p:embed/>
                 </p:oleObj>
               </mc:Choice>
@@ -5540,7 +5540,7 @@
           <a:graphicData uri="http://schemas.openxmlformats.org/presentationml/2006/ole">
             <mc:AlternateContent xmlns:mc="http://schemas.openxmlformats.org/markup-compatibility/2006">
               <mc:Choice xmlns:v="urn:schemas-microsoft-com:vml" Requires="v">
-                <p:oleObj spid="_x0000_s1207" name="Worksheet" r:id="rId37" imgW="1663700" imgH="825500" progId="Excel.Sheet.12">
+                <p:oleObj spid="_x0000_s1220" name="Worksheet" r:id="rId37" imgW="1663700" imgH="825500" progId="Excel.Sheet.12">
                   <p:embed/>
                 </p:oleObj>
               </mc:Choice>

</xml_diff>